<commit_message>
rename E03 & added thumnails
</commit_message>
<xml_diff>
--- a/SharedResources/Thumbnails.pptx
+++ b/SharedResources/Thumbnails.pptx
@@ -8,6 +8,11 @@
     <p:sldId id="256" r:id="rId2"/>
     <p:sldId id="257" r:id="rId3"/>
     <p:sldId id="258" r:id="rId4"/>
+    <p:sldId id="259" r:id="rId5"/>
+    <p:sldId id="260" r:id="rId6"/>
+    <p:sldId id="261" r:id="rId7"/>
+    <p:sldId id="262" r:id="rId8"/>
+    <p:sldId id="263" r:id="rId9"/>
   </p:sldIdLst>
   <p:sldSz cx="12192000" cy="6858000"/>
   <p:notesSz cx="6858000" cy="9144000"/>
@@ -3592,10 +3597,10 @@
       </p:pic>
       <p:sp>
         <p:nvSpPr>
-          <p:cNvPr id="7" name="TextBox 6">
-            <a:extLst>
-              <a:ext uri="{FF2B5EF4-FFF2-40B4-BE49-F238E27FC236}">
-                <a16:creationId xmlns:a16="http://schemas.microsoft.com/office/drawing/2014/main" id="{A3DAADE5-6914-79B5-3D52-5118A7E030AC}"/>
+          <p:cNvPr id="8" name="TextBox 7">
+            <a:extLst>
+              <a:ext uri="{FF2B5EF4-FFF2-40B4-BE49-F238E27FC236}">
+                <a16:creationId xmlns:a16="http://schemas.microsoft.com/office/drawing/2014/main" id="{33F1D6A1-3CF8-C4DD-CB43-EC7A973FD006}"/>
               </a:ext>
             </a:extLst>
           </p:cNvPr>
@@ -3604,8 +3609,8 @@
         </p:nvSpPr>
         <p:spPr>
           <a:xfrm>
-            <a:off x="989766" y="3820486"/>
-            <a:ext cx="10110460" cy="1446550"/>
+            <a:off x="0" y="3820486"/>
+            <a:ext cx="12192000" cy="1446550"/>
           </a:xfrm>
           <a:prstGeom prst="rect">
             <a:avLst/>
@@ -3613,11 +3618,12 @@
           <a:noFill/>
         </p:spPr>
         <p:txBody>
-          <a:bodyPr wrap="none" rtlCol="0">
+          <a:bodyPr wrap="square" rtlCol="0">
             <a:spAutoFit/>
           </a:bodyPr>
           <a:lstStyle/>
           <a:p>
+            <a:pPr algn="ctr"/>
             <a:r>
               <a:rPr lang="en-GB" sz="8800" dirty="0">
                 <a:solidFill>
@@ -3625,7 +3631,7 @@
                 </a:solidFill>
                 <a:latin typeface="Consolas" panose="020B0609020204030204" pitchFamily="49" charset="0"/>
               </a:rPr>
-              <a:t>01. Introduction</a:t>
+              <a:t>01. Motivation</a:t>
             </a:r>
           </a:p>
         </p:txBody>
@@ -3795,6 +3801,871 @@
     <p:extLst>
       <p:ext uri="{BB962C8B-B14F-4D97-AF65-F5344CB8AC3E}">
         <p14:creationId xmlns:p14="http://schemas.microsoft.com/office/powerpoint/2010/main" val="1411344234"/>
+      </p:ext>
+    </p:extLst>
+  </p:cSld>
+  <p:clrMapOvr>
+    <a:masterClrMapping/>
+  </p:clrMapOvr>
+</p:sld>
+</file>
+
+<file path=ppt/slides/slide4.xml><?xml version="1.0" encoding="utf-8"?>
+<p:sld xmlns:a="http://schemas.openxmlformats.org/drawingml/2006/main" xmlns:r="http://schemas.openxmlformats.org/officeDocument/2006/relationships" xmlns:p="http://schemas.openxmlformats.org/presentationml/2006/main">
+  <p:cSld>
+    <p:spTree>
+      <p:nvGrpSpPr>
+        <p:cNvPr id="1" name="">
+          <a:extLst>
+            <a:ext uri="{FF2B5EF4-FFF2-40B4-BE49-F238E27FC236}">
+              <a16:creationId xmlns:a16="http://schemas.microsoft.com/office/drawing/2014/main" id="{B81F0463-0B9A-3D01-6EB7-1E61EF070E33}"/>
+            </a:ext>
+          </a:extLst>
+        </p:cNvPr>
+        <p:cNvGrpSpPr/>
+        <p:nvPr/>
+      </p:nvGrpSpPr>
+      <p:grpSpPr>
+        <a:xfrm>
+          <a:off x="0" y="0"/>
+          <a:ext cx="0" cy="0"/>
+          <a:chOff x="0" y="0"/>
+          <a:chExt cx="0" cy="0"/>
+        </a:xfrm>
+      </p:grpSpPr>
+      <p:sp>
+        <p:nvSpPr>
+          <p:cNvPr id="4" name="Rectangle 3">
+            <a:extLst>
+              <a:ext uri="{FF2B5EF4-FFF2-40B4-BE49-F238E27FC236}">
+                <a16:creationId xmlns:a16="http://schemas.microsoft.com/office/drawing/2014/main" id="{6D195A65-434B-DE77-D344-99524CEF7D50}"/>
+              </a:ext>
+            </a:extLst>
+          </p:cNvPr>
+          <p:cNvSpPr/>
+          <p:nvPr/>
+        </p:nvSpPr>
+        <p:spPr>
+          <a:xfrm>
+            <a:off x="0" y="0"/>
+            <a:ext cx="12192000" cy="6858000"/>
+          </a:xfrm>
+          <a:prstGeom prst="rect">
+            <a:avLst/>
+          </a:prstGeom>
+          <a:solidFill>
+            <a:schemeClr val="tx1"/>
+          </a:solidFill>
+        </p:spPr>
+        <p:style>
+          <a:lnRef idx="2">
+            <a:schemeClr val="dk1">
+              <a:shade val="15000"/>
+            </a:schemeClr>
+          </a:lnRef>
+          <a:fillRef idx="1">
+            <a:schemeClr val="dk1"/>
+          </a:fillRef>
+          <a:effectRef idx="0">
+            <a:schemeClr val="dk1"/>
+          </a:effectRef>
+          <a:fontRef idx="minor">
+            <a:schemeClr val="lt1"/>
+          </a:fontRef>
+        </p:style>
+        <p:txBody>
+          <a:bodyPr rtlCol="0" anchor="ctr"/>
+          <a:lstStyle/>
+          <a:p>
+            <a:pPr algn="ctr"/>
+            <a:endParaRPr lang="en-GB" dirty="0"/>
+          </a:p>
+        </p:txBody>
+      </p:sp>
+      <p:pic>
+        <p:nvPicPr>
+          <p:cNvPr id="6" name="Picture 5" descr="A group of colorful cubes&#10;&#10;Description automatically generated">
+            <a:extLst>
+              <a:ext uri="{FF2B5EF4-FFF2-40B4-BE49-F238E27FC236}">
+                <a16:creationId xmlns:a16="http://schemas.microsoft.com/office/drawing/2014/main" id="{F903A374-5A79-6158-AFB8-5915106367EB}"/>
+              </a:ext>
+            </a:extLst>
+          </p:cNvPr>
+          <p:cNvPicPr>
+            <a:picLocks noChangeAspect="1"/>
+          </p:cNvPicPr>
+          <p:nvPr/>
+        </p:nvPicPr>
+        <p:blipFill>
+          <a:blip r:embed="rId2">
+            <a:extLst>
+              <a:ext uri="{28A0092B-C50C-407E-A947-70E740481C1C}">
+                <a14:useLocalDpi xmlns:a14="http://schemas.microsoft.com/office/drawing/2010/main" val="0"/>
+              </a:ext>
+            </a:extLst>
+          </a:blip>
+          <a:srcRect l="9227" t="13963" b="28134"/>
+          <a:stretch/>
+        </p:blipFill>
+        <p:spPr>
+          <a:xfrm>
+            <a:off x="822036" y="600364"/>
+            <a:ext cx="10445921" cy="3075709"/>
+          </a:xfrm>
+          <a:prstGeom prst="rect">
+            <a:avLst/>
+          </a:prstGeom>
+        </p:spPr>
+      </p:pic>
+      <p:sp>
+        <p:nvSpPr>
+          <p:cNvPr id="7" name="TextBox 6">
+            <a:extLst>
+              <a:ext uri="{FF2B5EF4-FFF2-40B4-BE49-F238E27FC236}">
+                <a16:creationId xmlns:a16="http://schemas.microsoft.com/office/drawing/2014/main" id="{B6F0969C-FABF-7213-F002-6D7DA3D5C06D}"/>
+              </a:ext>
+            </a:extLst>
+          </p:cNvPr>
+          <p:cNvSpPr txBox="1"/>
+          <p:nvPr/>
+        </p:nvSpPr>
+        <p:spPr>
+          <a:xfrm>
+            <a:off x="0" y="3820486"/>
+            <a:ext cx="12192000" cy="1446550"/>
+          </a:xfrm>
+          <a:prstGeom prst="rect">
+            <a:avLst/>
+          </a:prstGeom>
+          <a:noFill/>
+        </p:spPr>
+        <p:txBody>
+          <a:bodyPr wrap="square" rtlCol="0">
+            <a:spAutoFit/>
+          </a:bodyPr>
+          <a:lstStyle/>
+          <a:p>
+            <a:pPr algn="ctr"/>
+            <a:r>
+              <a:rPr lang="en-GB" sz="8800" dirty="0">
+                <a:solidFill>
+                  <a:schemeClr val="bg1"/>
+                </a:solidFill>
+                <a:latin typeface="Consolas" panose="020B0609020204030204" pitchFamily="49" charset="0"/>
+              </a:rPr>
+              <a:t>03. Getting Started</a:t>
+            </a:r>
+          </a:p>
+        </p:txBody>
+      </p:sp>
+    </p:spTree>
+    <p:extLst>
+      <p:ext uri="{BB962C8B-B14F-4D97-AF65-F5344CB8AC3E}">
+        <p14:creationId xmlns:p14="http://schemas.microsoft.com/office/powerpoint/2010/main" val="4060431900"/>
+      </p:ext>
+    </p:extLst>
+  </p:cSld>
+  <p:clrMapOvr>
+    <a:masterClrMapping/>
+  </p:clrMapOvr>
+</p:sld>
+</file>
+
+<file path=ppt/slides/slide5.xml><?xml version="1.0" encoding="utf-8"?>
+<p:sld xmlns:a="http://schemas.openxmlformats.org/drawingml/2006/main" xmlns:r="http://schemas.openxmlformats.org/officeDocument/2006/relationships" xmlns:p="http://schemas.openxmlformats.org/presentationml/2006/main">
+  <p:cSld>
+    <p:spTree>
+      <p:nvGrpSpPr>
+        <p:cNvPr id="1" name="">
+          <a:extLst>
+            <a:ext uri="{FF2B5EF4-FFF2-40B4-BE49-F238E27FC236}">
+              <a16:creationId xmlns:a16="http://schemas.microsoft.com/office/drawing/2014/main" id="{CD9C5375-F44D-E1F5-81DC-C3B1A0A93B9A}"/>
+            </a:ext>
+          </a:extLst>
+        </p:cNvPr>
+        <p:cNvGrpSpPr/>
+        <p:nvPr/>
+      </p:nvGrpSpPr>
+      <p:grpSpPr>
+        <a:xfrm>
+          <a:off x="0" y="0"/>
+          <a:ext cx="0" cy="0"/>
+          <a:chOff x="0" y="0"/>
+          <a:chExt cx="0" cy="0"/>
+        </a:xfrm>
+      </p:grpSpPr>
+      <p:sp>
+        <p:nvSpPr>
+          <p:cNvPr id="4" name="Rectangle 3">
+            <a:extLst>
+              <a:ext uri="{FF2B5EF4-FFF2-40B4-BE49-F238E27FC236}">
+                <a16:creationId xmlns:a16="http://schemas.microsoft.com/office/drawing/2014/main" id="{6CCA04B8-E6E8-A753-93ED-AF6AD01557C7}"/>
+              </a:ext>
+            </a:extLst>
+          </p:cNvPr>
+          <p:cNvSpPr/>
+          <p:nvPr/>
+        </p:nvSpPr>
+        <p:spPr>
+          <a:xfrm>
+            <a:off x="0" y="0"/>
+            <a:ext cx="12192000" cy="6858000"/>
+          </a:xfrm>
+          <a:prstGeom prst="rect">
+            <a:avLst/>
+          </a:prstGeom>
+          <a:solidFill>
+            <a:schemeClr val="tx1"/>
+          </a:solidFill>
+        </p:spPr>
+        <p:style>
+          <a:lnRef idx="2">
+            <a:schemeClr val="dk1">
+              <a:shade val="15000"/>
+            </a:schemeClr>
+          </a:lnRef>
+          <a:fillRef idx="1">
+            <a:schemeClr val="dk1"/>
+          </a:fillRef>
+          <a:effectRef idx="0">
+            <a:schemeClr val="dk1"/>
+          </a:effectRef>
+          <a:fontRef idx="minor">
+            <a:schemeClr val="lt1"/>
+          </a:fontRef>
+        </p:style>
+        <p:txBody>
+          <a:bodyPr rtlCol="0" anchor="ctr"/>
+          <a:lstStyle/>
+          <a:p>
+            <a:pPr algn="ctr"/>
+            <a:endParaRPr lang="en-GB" dirty="0"/>
+          </a:p>
+        </p:txBody>
+      </p:sp>
+      <p:pic>
+        <p:nvPicPr>
+          <p:cNvPr id="6" name="Picture 5" descr="A group of colorful cubes&#10;&#10;Description automatically generated">
+            <a:extLst>
+              <a:ext uri="{FF2B5EF4-FFF2-40B4-BE49-F238E27FC236}">
+                <a16:creationId xmlns:a16="http://schemas.microsoft.com/office/drawing/2014/main" id="{D93EF06D-FECF-7351-F7F4-91CFF7EAB91B}"/>
+              </a:ext>
+            </a:extLst>
+          </p:cNvPr>
+          <p:cNvPicPr>
+            <a:picLocks noChangeAspect="1"/>
+          </p:cNvPicPr>
+          <p:nvPr/>
+        </p:nvPicPr>
+        <p:blipFill>
+          <a:blip r:embed="rId2">
+            <a:extLst>
+              <a:ext uri="{28A0092B-C50C-407E-A947-70E740481C1C}">
+                <a14:useLocalDpi xmlns:a14="http://schemas.microsoft.com/office/drawing/2010/main" val="0"/>
+              </a:ext>
+            </a:extLst>
+          </a:blip>
+          <a:srcRect l="9227" t="13963" b="28134"/>
+          <a:stretch/>
+        </p:blipFill>
+        <p:spPr>
+          <a:xfrm>
+            <a:off x="822036" y="600364"/>
+            <a:ext cx="10445921" cy="3075709"/>
+          </a:xfrm>
+          <a:prstGeom prst="rect">
+            <a:avLst/>
+          </a:prstGeom>
+        </p:spPr>
+      </p:pic>
+      <p:sp>
+        <p:nvSpPr>
+          <p:cNvPr id="7" name="TextBox 6">
+            <a:extLst>
+              <a:ext uri="{FF2B5EF4-FFF2-40B4-BE49-F238E27FC236}">
+                <a16:creationId xmlns:a16="http://schemas.microsoft.com/office/drawing/2014/main" id="{D4F31D3D-F789-6308-7BE7-25552843BBCC}"/>
+              </a:ext>
+            </a:extLst>
+          </p:cNvPr>
+          <p:cNvSpPr txBox="1"/>
+          <p:nvPr/>
+        </p:nvSpPr>
+        <p:spPr>
+          <a:xfrm>
+            <a:off x="0" y="3820486"/>
+            <a:ext cx="12192000" cy="1446550"/>
+          </a:xfrm>
+          <a:prstGeom prst="rect">
+            <a:avLst/>
+          </a:prstGeom>
+          <a:noFill/>
+        </p:spPr>
+        <p:txBody>
+          <a:bodyPr wrap="square" rtlCol="0">
+            <a:spAutoFit/>
+          </a:bodyPr>
+          <a:lstStyle/>
+          <a:p>
+            <a:pPr algn="ctr"/>
+            <a:r>
+              <a:rPr lang="en-GB" sz="8800" dirty="0">
+                <a:solidFill>
+                  <a:schemeClr val="bg1"/>
+                </a:solidFill>
+                <a:latin typeface="Consolas" panose="020B0609020204030204" pitchFamily="49" charset="0"/>
+              </a:rPr>
+              <a:t>04. </a:t>
+            </a:r>
+            <a:r>
+              <a:rPr lang="en-GB" sz="8800" dirty="0" err="1">
+                <a:solidFill>
+                  <a:schemeClr val="bg1"/>
+                </a:solidFill>
+                <a:latin typeface="Consolas" panose="020B0609020204030204" pitchFamily="49" charset="0"/>
+              </a:rPr>
+              <a:t>stdCallback</a:t>
+            </a:r>
+            <a:endParaRPr lang="en-GB" sz="8800" dirty="0">
+              <a:solidFill>
+                <a:schemeClr val="bg1"/>
+              </a:solidFill>
+              <a:latin typeface="Consolas" panose="020B0609020204030204" pitchFamily="49" charset="0"/>
+            </a:endParaRPr>
+          </a:p>
+        </p:txBody>
+      </p:sp>
+    </p:spTree>
+    <p:extLst>
+      <p:ext uri="{BB962C8B-B14F-4D97-AF65-F5344CB8AC3E}">
+        <p14:creationId xmlns:p14="http://schemas.microsoft.com/office/powerpoint/2010/main" val="594113680"/>
+      </p:ext>
+    </p:extLst>
+  </p:cSld>
+  <p:clrMapOvr>
+    <a:masterClrMapping/>
+  </p:clrMapOvr>
+</p:sld>
+</file>
+
+<file path=ppt/slides/slide6.xml><?xml version="1.0" encoding="utf-8"?>
+<p:sld xmlns:a="http://schemas.openxmlformats.org/drawingml/2006/main" xmlns:r="http://schemas.openxmlformats.org/officeDocument/2006/relationships" xmlns:p="http://schemas.openxmlformats.org/presentationml/2006/main">
+  <p:cSld>
+    <p:spTree>
+      <p:nvGrpSpPr>
+        <p:cNvPr id="1" name="">
+          <a:extLst>
+            <a:ext uri="{FF2B5EF4-FFF2-40B4-BE49-F238E27FC236}">
+              <a16:creationId xmlns:a16="http://schemas.microsoft.com/office/drawing/2014/main" id="{BEDC86E8-A5E7-0BFF-FF9E-E4681E031EA8}"/>
+            </a:ext>
+          </a:extLst>
+        </p:cNvPr>
+        <p:cNvGrpSpPr/>
+        <p:nvPr/>
+      </p:nvGrpSpPr>
+      <p:grpSpPr>
+        <a:xfrm>
+          <a:off x="0" y="0"/>
+          <a:ext cx="0" cy="0"/>
+          <a:chOff x="0" y="0"/>
+          <a:chExt cx="0" cy="0"/>
+        </a:xfrm>
+      </p:grpSpPr>
+      <p:sp>
+        <p:nvSpPr>
+          <p:cNvPr id="4" name="Rectangle 3">
+            <a:extLst>
+              <a:ext uri="{FF2B5EF4-FFF2-40B4-BE49-F238E27FC236}">
+                <a16:creationId xmlns:a16="http://schemas.microsoft.com/office/drawing/2014/main" id="{6124AF3F-9E2E-506F-977F-BAC2F1A8FFDD}"/>
+              </a:ext>
+            </a:extLst>
+          </p:cNvPr>
+          <p:cNvSpPr/>
+          <p:nvPr/>
+        </p:nvSpPr>
+        <p:spPr>
+          <a:xfrm>
+            <a:off x="0" y="0"/>
+            <a:ext cx="12192000" cy="6858000"/>
+          </a:xfrm>
+          <a:prstGeom prst="rect">
+            <a:avLst/>
+          </a:prstGeom>
+          <a:solidFill>
+            <a:schemeClr val="tx1"/>
+          </a:solidFill>
+        </p:spPr>
+        <p:style>
+          <a:lnRef idx="2">
+            <a:schemeClr val="dk1">
+              <a:shade val="15000"/>
+            </a:schemeClr>
+          </a:lnRef>
+          <a:fillRef idx="1">
+            <a:schemeClr val="dk1"/>
+          </a:fillRef>
+          <a:effectRef idx="0">
+            <a:schemeClr val="dk1"/>
+          </a:effectRef>
+          <a:fontRef idx="minor">
+            <a:schemeClr val="lt1"/>
+          </a:fontRef>
+        </p:style>
+        <p:txBody>
+          <a:bodyPr rtlCol="0" anchor="ctr"/>
+          <a:lstStyle/>
+          <a:p>
+            <a:pPr algn="ctr"/>
+            <a:endParaRPr lang="en-GB" dirty="0"/>
+          </a:p>
+        </p:txBody>
+      </p:sp>
+      <p:pic>
+        <p:nvPicPr>
+          <p:cNvPr id="6" name="Picture 5" descr="A group of colorful cubes&#10;&#10;Description automatically generated">
+            <a:extLst>
+              <a:ext uri="{FF2B5EF4-FFF2-40B4-BE49-F238E27FC236}">
+                <a16:creationId xmlns:a16="http://schemas.microsoft.com/office/drawing/2014/main" id="{CD0E17F2-ACFD-C56F-77EA-EC2F5ECE0356}"/>
+              </a:ext>
+            </a:extLst>
+          </p:cNvPr>
+          <p:cNvPicPr>
+            <a:picLocks noChangeAspect="1"/>
+          </p:cNvPicPr>
+          <p:nvPr/>
+        </p:nvPicPr>
+        <p:blipFill>
+          <a:blip r:embed="rId2">
+            <a:extLst>
+              <a:ext uri="{28A0092B-C50C-407E-A947-70E740481C1C}">
+                <a14:useLocalDpi xmlns:a14="http://schemas.microsoft.com/office/drawing/2010/main" val="0"/>
+              </a:ext>
+            </a:extLst>
+          </a:blip>
+          <a:srcRect l="9227" t="13963" b="28134"/>
+          <a:stretch/>
+        </p:blipFill>
+        <p:spPr>
+          <a:xfrm>
+            <a:off x="822036" y="600364"/>
+            <a:ext cx="10445921" cy="3075709"/>
+          </a:xfrm>
+          <a:prstGeom prst="rect">
+            <a:avLst/>
+          </a:prstGeom>
+        </p:spPr>
+      </p:pic>
+      <p:sp>
+        <p:nvSpPr>
+          <p:cNvPr id="7" name="TextBox 6">
+            <a:extLst>
+              <a:ext uri="{FF2B5EF4-FFF2-40B4-BE49-F238E27FC236}">
+                <a16:creationId xmlns:a16="http://schemas.microsoft.com/office/drawing/2014/main" id="{D30C4494-02D9-465E-2DFE-50AF526A7225}"/>
+              </a:ext>
+            </a:extLst>
+          </p:cNvPr>
+          <p:cNvSpPr txBox="1"/>
+          <p:nvPr/>
+        </p:nvSpPr>
+        <p:spPr>
+          <a:xfrm>
+            <a:off x="0" y="3820486"/>
+            <a:ext cx="12192000" cy="1446550"/>
+          </a:xfrm>
+          <a:prstGeom prst="rect">
+            <a:avLst/>
+          </a:prstGeom>
+          <a:noFill/>
+        </p:spPr>
+        <p:txBody>
+          <a:bodyPr wrap="square" rtlCol="0">
+            <a:spAutoFit/>
+          </a:bodyPr>
+          <a:lstStyle/>
+          <a:p>
+            <a:pPr algn="ctr"/>
+            <a:r>
+              <a:rPr lang="en-GB" sz="8800" dirty="0">
+                <a:solidFill>
+                  <a:schemeClr val="bg1"/>
+                </a:solidFill>
+                <a:latin typeface="Consolas" panose="020B0609020204030204" pitchFamily="49" charset="0"/>
+              </a:rPr>
+              <a:t>05. </a:t>
+            </a:r>
+            <a:r>
+              <a:rPr lang="en-GB" sz="8800" dirty="0" err="1">
+                <a:solidFill>
+                  <a:schemeClr val="bg1"/>
+                </a:solidFill>
+                <a:latin typeface="Consolas" panose="020B0609020204030204" pitchFamily="49" charset="0"/>
+              </a:rPr>
+              <a:t>stdLambda</a:t>
+            </a:r>
+            <a:endParaRPr lang="en-GB" sz="8800" dirty="0">
+              <a:solidFill>
+                <a:schemeClr val="bg1"/>
+              </a:solidFill>
+              <a:latin typeface="Consolas" panose="020B0609020204030204" pitchFamily="49" charset="0"/>
+            </a:endParaRPr>
+          </a:p>
+        </p:txBody>
+      </p:sp>
+    </p:spTree>
+    <p:extLst>
+      <p:ext uri="{BB962C8B-B14F-4D97-AF65-F5344CB8AC3E}">
+        <p14:creationId xmlns:p14="http://schemas.microsoft.com/office/powerpoint/2010/main" val="1504697455"/>
+      </p:ext>
+    </p:extLst>
+  </p:cSld>
+  <p:clrMapOvr>
+    <a:masterClrMapping/>
+  </p:clrMapOvr>
+</p:sld>
+</file>
+
+<file path=ppt/slides/slide7.xml><?xml version="1.0" encoding="utf-8"?>
+<p:sld xmlns:a="http://schemas.openxmlformats.org/drawingml/2006/main" xmlns:r="http://schemas.openxmlformats.org/officeDocument/2006/relationships" xmlns:p="http://schemas.openxmlformats.org/presentationml/2006/main">
+  <p:cSld>
+    <p:spTree>
+      <p:nvGrpSpPr>
+        <p:cNvPr id="1" name="">
+          <a:extLst>
+            <a:ext uri="{FF2B5EF4-FFF2-40B4-BE49-F238E27FC236}">
+              <a16:creationId xmlns:a16="http://schemas.microsoft.com/office/drawing/2014/main" id="{07D9E95B-AB4C-1AF6-5822-F377130B172D}"/>
+            </a:ext>
+          </a:extLst>
+        </p:cNvPr>
+        <p:cNvGrpSpPr/>
+        <p:nvPr/>
+      </p:nvGrpSpPr>
+      <p:grpSpPr>
+        <a:xfrm>
+          <a:off x="0" y="0"/>
+          <a:ext cx="0" cy="0"/>
+          <a:chOff x="0" y="0"/>
+          <a:chExt cx="0" cy="0"/>
+        </a:xfrm>
+      </p:grpSpPr>
+      <p:sp>
+        <p:nvSpPr>
+          <p:cNvPr id="4" name="Rectangle 3">
+            <a:extLst>
+              <a:ext uri="{FF2B5EF4-FFF2-40B4-BE49-F238E27FC236}">
+                <a16:creationId xmlns:a16="http://schemas.microsoft.com/office/drawing/2014/main" id="{F6317E37-4928-2A7C-1FB0-DF46DFEDAA66}"/>
+              </a:ext>
+            </a:extLst>
+          </p:cNvPr>
+          <p:cNvSpPr/>
+          <p:nvPr/>
+        </p:nvSpPr>
+        <p:spPr>
+          <a:xfrm>
+            <a:off x="0" y="0"/>
+            <a:ext cx="12192000" cy="6858000"/>
+          </a:xfrm>
+          <a:prstGeom prst="rect">
+            <a:avLst/>
+          </a:prstGeom>
+          <a:solidFill>
+            <a:schemeClr val="tx1"/>
+          </a:solidFill>
+        </p:spPr>
+        <p:style>
+          <a:lnRef idx="2">
+            <a:schemeClr val="dk1">
+              <a:shade val="15000"/>
+            </a:schemeClr>
+          </a:lnRef>
+          <a:fillRef idx="1">
+            <a:schemeClr val="dk1"/>
+          </a:fillRef>
+          <a:effectRef idx="0">
+            <a:schemeClr val="dk1"/>
+          </a:effectRef>
+          <a:fontRef idx="minor">
+            <a:schemeClr val="lt1"/>
+          </a:fontRef>
+        </p:style>
+        <p:txBody>
+          <a:bodyPr rtlCol="0" anchor="ctr"/>
+          <a:lstStyle/>
+          <a:p>
+            <a:pPr algn="ctr"/>
+            <a:endParaRPr lang="en-GB" dirty="0"/>
+          </a:p>
+        </p:txBody>
+      </p:sp>
+      <p:pic>
+        <p:nvPicPr>
+          <p:cNvPr id="6" name="Picture 5" descr="A group of colorful cubes&#10;&#10;Description automatically generated">
+            <a:extLst>
+              <a:ext uri="{FF2B5EF4-FFF2-40B4-BE49-F238E27FC236}">
+                <a16:creationId xmlns:a16="http://schemas.microsoft.com/office/drawing/2014/main" id="{B038F144-71E1-F206-0223-0FB8E46F5271}"/>
+              </a:ext>
+            </a:extLst>
+          </p:cNvPr>
+          <p:cNvPicPr>
+            <a:picLocks noChangeAspect="1"/>
+          </p:cNvPicPr>
+          <p:nvPr/>
+        </p:nvPicPr>
+        <p:blipFill>
+          <a:blip r:embed="rId2">
+            <a:extLst>
+              <a:ext uri="{28A0092B-C50C-407E-A947-70E740481C1C}">
+                <a14:useLocalDpi xmlns:a14="http://schemas.microsoft.com/office/drawing/2010/main" val="0"/>
+              </a:ext>
+            </a:extLst>
+          </a:blip>
+          <a:srcRect l="9227" t="13963" b="28134"/>
+          <a:stretch/>
+        </p:blipFill>
+        <p:spPr>
+          <a:xfrm>
+            <a:off x="822036" y="600364"/>
+            <a:ext cx="10445921" cy="3075709"/>
+          </a:xfrm>
+          <a:prstGeom prst="rect">
+            <a:avLst/>
+          </a:prstGeom>
+        </p:spPr>
+      </p:pic>
+      <p:sp>
+        <p:nvSpPr>
+          <p:cNvPr id="7" name="TextBox 6">
+            <a:extLst>
+              <a:ext uri="{FF2B5EF4-FFF2-40B4-BE49-F238E27FC236}">
+                <a16:creationId xmlns:a16="http://schemas.microsoft.com/office/drawing/2014/main" id="{72E776BC-6D1B-AC60-24F0-87D451128586}"/>
+              </a:ext>
+            </a:extLst>
+          </p:cNvPr>
+          <p:cNvSpPr txBox="1"/>
+          <p:nvPr/>
+        </p:nvSpPr>
+        <p:spPr>
+          <a:xfrm>
+            <a:off x="0" y="3820486"/>
+            <a:ext cx="12192000" cy="1446550"/>
+          </a:xfrm>
+          <a:prstGeom prst="rect">
+            <a:avLst/>
+          </a:prstGeom>
+          <a:noFill/>
+        </p:spPr>
+        <p:txBody>
+          <a:bodyPr wrap="square" rtlCol="0">
+            <a:spAutoFit/>
+          </a:bodyPr>
+          <a:lstStyle/>
+          <a:p>
+            <a:pPr algn="ctr"/>
+            <a:r>
+              <a:rPr lang="en-GB" sz="8800" dirty="0">
+                <a:solidFill>
+                  <a:schemeClr val="bg1"/>
+                </a:solidFill>
+                <a:latin typeface="Consolas" panose="020B0609020204030204" pitchFamily="49" charset="0"/>
+              </a:rPr>
+              <a:t>06. </a:t>
+            </a:r>
+            <a:r>
+              <a:rPr lang="en-GB" sz="8800" dirty="0" err="1">
+                <a:solidFill>
+                  <a:schemeClr val="bg1"/>
+                </a:solidFill>
+                <a:latin typeface="Consolas" panose="020B0609020204030204" pitchFamily="49" charset="0"/>
+              </a:rPr>
+              <a:t>stdArray</a:t>
+            </a:r>
+            <a:endParaRPr lang="en-GB" sz="8800" dirty="0">
+              <a:solidFill>
+                <a:schemeClr val="bg1"/>
+              </a:solidFill>
+              <a:latin typeface="Consolas" panose="020B0609020204030204" pitchFamily="49" charset="0"/>
+            </a:endParaRPr>
+          </a:p>
+        </p:txBody>
+      </p:sp>
+    </p:spTree>
+    <p:extLst>
+      <p:ext uri="{BB962C8B-B14F-4D97-AF65-F5344CB8AC3E}">
+        <p14:creationId xmlns:p14="http://schemas.microsoft.com/office/powerpoint/2010/main" val="813327294"/>
+      </p:ext>
+    </p:extLst>
+  </p:cSld>
+  <p:clrMapOvr>
+    <a:masterClrMapping/>
+  </p:clrMapOvr>
+</p:sld>
+</file>
+
+<file path=ppt/slides/slide8.xml><?xml version="1.0" encoding="utf-8"?>
+<p:sld xmlns:a="http://schemas.openxmlformats.org/drawingml/2006/main" xmlns:r="http://schemas.openxmlformats.org/officeDocument/2006/relationships" xmlns:p="http://schemas.openxmlformats.org/presentationml/2006/main">
+  <p:cSld>
+    <p:spTree>
+      <p:nvGrpSpPr>
+        <p:cNvPr id="1" name="">
+          <a:extLst>
+            <a:ext uri="{FF2B5EF4-FFF2-40B4-BE49-F238E27FC236}">
+              <a16:creationId xmlns:a16="http://schemas.microsoft.com/office/drawing/2014/main" id="{98C86CA3-1626-AC98-982F-3EB57DEFFA48}"/>
+            </a:ext>
+          </a:extLst>
+        </p:cNvPr>
+        <p:cNvGrpSpPr/>
+        <p:nvPr/>
+      </p:nvGrpSpPr>
+      <p:grpSpPr>
+        <a:xfrm>
+          <a:off x="0" y="0"/>
+          <a:ext cx="0" cy="0"/>
+          <a:chOff x="0" y="0"/>
+          <a:chExt cx="0" cy="0"/>
+        </a:xfrm>
+      </p:grpSpPr>
+      <p:sp>
+        <p:nvSpPr>
+          <p:cNvPr id="4" name="Rectangle 3">
+            <a:extLst>
+              <a:ext uri="{FF2B5EF4-FFF2-40B4-BE49-F238E27FC236}">
+                <a16:creationId xmlns:a16="http://schemas.microsoft.com/office/drawing/2014/main" id="{5E2F2FB1-0E43-AD37-B99C-05E1776277C9}"/>
+              </a:ext>
+            </a:extLst>
+          </p:cNvPr>
+          <p:cNvSpPr/>
+          <p:nvPr/>
+        </p:nvSpPr>
+        <p:spPr>
+          <a:xfrm>
+            <a:off x="0" y="0"/>
+            <a:ext cx="12192000" cy="6858000"/>
+          </a:xfrm>
+          <a:prstGeom prst="rect">
+            <a:avLst/>
+          </a:prstGeom>
+          <a:solidFill>
+            <a:schemeClr val="tx1"/>
+          </a:solidFill>
+        </p:spPr>
+        <p:style>
+          <a:lnRef idx="2">
+            <a:schemeClr val="dk1">
+              <a:shade val="15000"/>
+            </a:schemeClr>
+          </a:lnRef>
+          <a:fillRef idx="1">
+            <a:schemeClr val="dk1"/>
+          </a:fillRef>
+          <a:effectRef idx="0">
+            <a:schemeClr val="dk1"/>
+          </a:effectRef>
+          <a:fontRef idx="minor">
+            <a:schemeClr val="lt1"/>
+          </a:fontRef>
+        </p:style>
+        <p:txBody>
+          <a:bodyPr rtlCol="0" anchor="ctr"/>
+          <a:lstStyle/>
+          <a:p>
+            <a:pPr algn="ctr"/>
+            <a:endParaRPr lang="en-GB" dirty="0"/>
+          </a:p>
+        </p:txBody>
+      </p:sp>
+      <p:pic>
+        <p:nvPicPr>
+          <p:cNvPr id="6" name="Picture 5" descr="A group of colorful cubes&#10;&#10;Description automatically generated">
+            <a:extLst>
+              <a:ext uri="{FF2B5EF4-FFF2-40B4-BE49-F238E27FC236}">
+                <a16:creationId xmlns:a16="http://schemas.microsoft.com/office/drawing/2014/main" id="{8B394BEC-74F7-8442-2B93-73EF789FDCE2}"/>
+              </a:ext>
+            </a:extLst>
+          </p:cNvPr>
+          <p:cNvPicPr>
+            <a:picLocks noChangeAspect="1"/>
+          </p:cNvPicPr>
+          <p:nvPr/>
+        </p:nvPicPr>
+        <p:blipFill>
+          <a:blip r:embed="rId2">
+            <a:extLst>
+              <a:ext uri="{28A0092B-C50C-407E-A947-70E740481C1C}">
+                <a14:useLocalDpi xmlns:a14="http://schemas.microsoft.com/office/drawing/2010/main" val="0"/>
+              </a:ext>
+            </a:extLst>
+          </a:blip>
+          <a:srcRect l="9227" t="13963" b="28134"/>
+          <a:stretch/>
+        </p:blipFill>
+        <p:spPr>
+          <a:xfrm>
+            <a:off x="822036" y="600364"/>
+            <a:ext cx="10445921" cy="3075709"/>
+          </a:xfrm>
+          <a:prstGeom prst="rect">
+            <a:avLst/>
+          </a:prstGeom>
+        </p:spPr>
+      </p:pic>
+      <p:sp>
+        <p:nvSpPr>
+          <p:cNvPr id="7" name="TextBox 6">
+            <a:extLst>
+              <a:ext uri="{FF2B5EF4-FFF2-40B4-BE49-F238E27FC236}">
+                <a16:creationId xmlns:a16="http://schemas.microsoft.com/office/drawing/2014/main" id="{6D3C5B9E-B6A3-207D-E5E7-E39A866A71E8}"/>
+              </a:ext>
+            </a:extLst>
+          </p:cNvPr>
+          <p:cNvSpPr txBox="1"/>
+          <p:nvPr/>
+        </p:nvSpPr>
+        <p:spPr>
+          <a:xfrm>
+            <a:off x="0" y="3820486"/>
+            <a:ext cx="12192000" cy="1446550"/>
+          </a:xfrm>
+          <a:prstGeom prst="rect">
+            <a:avLst/>
+          </a:prstGeom>
+          <a:noFill/>
+        </p:spPr>
+        <p:txBody>
+          <a:bodyPr wrap="square" rtlCol="0">
+            <a:spAutoFit/>
+          </a:bodyPr>
+          <a:lstStyle/>
+          <a:p>
+            <a:pPr algn="ctr"/>
+            <a:r>
+              <a:rPr lang="en-GB" sz="8800" dirty="0">
+                <a:solidFill>
+                  <a:schemeClr val="bg1"/>
+                </a:solidFill>
+                <a:latin typeface="Consolas" panose="020B0609020204030204" pitchFamily="49" charset="0"/>
+              </a:rPr>
+              <a:t>07. </a:t>
+            </a:r>
+            <a:r>
+              <a:rPr lang="en-GB" sz="8800" dirty="0" err="1">
+                <a:solidFill>
+                  <a:schemeClr val="bg1"/>
+                </a:solidFill>
+                <a:latin typeface="Consolas" panose="020B0609020204030204" pitchFamily="49" charset="0"/>
+              </a:rPr>
+              <a:t>stdEnumerator</a:t>
+            </a:r>
+            <a:endParaRPr lang="en-GB" sz="8800" dirty="0">
+              <a:solidFill>
+                <a:schemeClr val="bg1"/>
+              </a:solidFill>
+              <a:latin typeface="Consolas" panose="020B0609020204030204" pitchFamily="49" charset="0"/>
+            </a:endParaRPr>
+          </a:p>
+        </p:txBody>
+      </p:sp>
+    </p:spTree>
+    <p:extLst>
+      <p:ext uri="{BB962C8B-B14F-4D97-AF65-F5344CB8AC3E}">
+        <p14:creationId xmlns:p14="http://schemas.microsoft.com/office/powerpoint/2010/main" val="1144371805"/>
       </p:ext>
     </p:extLst>
   </p:cSld>

</xml_diff>